<commit_message>
Updating session 1 notes
</commit_message>
<xml_diff>
--- a/Chanco_ST6103_GLM_2019_Henrion_Session1.pptx
+++ b/Chanco_ST6103_GLM_2019_Henrion_Session1.pptx
@@ -7428,6 +7428,24 @@
             <a:r>
               <a:rPr/>
               <a:t> or some other software.</a:t>
+            </a:r>
+          </a:p>
+          <a:p>
+            <a:pPr lvl="1"/>
+            <a:r>
+              <a:rPr/>
+              <a:t>GitHub repository - will contain all course materials by the end of the week:</a:t>
+            </a:r>
+          </a:p>
+          <a:p>
+            <a:pPr lvl="1">
+              <a:buNone/>
+            </a:pPr>
+            <a:r>
+              <a:rPr>
+                <a:hlinkClick r:id="rId2"/>
+              </a:rPr>
+              <a:t>https://github.com/gitMarcH/Chanco_ST6103</a:t>
             </a:r>
           </a:p>
         </p:txBody>

</xml_diff>

<commit_message>
updating session1 notes, uploading session 2
</commit_message>
<xml_diff>
--- a/Chanco_ST6103_GLM_2019_Henrion_Session1.pptx
+++ b/Chanco_ST6103_GLM_2019_Henrion_Session1.pptx
@@ -20455,13 +20455,7 @@
                                   </m:e>
                                   <m:sub>
                                     <m:r>
-                                      <m:t>1</m:t>
-                                    </m:r>
-                                    <m:r>
-                                      <m:t>,</m:t>
-                                    </m:r>
-                                    <m:r>
-                                      <m:t>1</m:t>
+                                      <m:t>11</m:t>
                                     </m:r>
                                   </m:sub>
                                 </m:sSub>
@@ -20486,13 +20480,10 @@
                                   </m:e>
                                   <m:sub>
                                     <m:r>
-                                      <m:t>1</m:t>
+                                      <m:t>p</m:t>
                                     </m:r>
                                     <m:r>
-                                      <m:t>,</m:t>
-                                    </m:r>
-                                    <m:r>
-                                      <m:t>p</m:t>
+                                      <m:t>1</m:t>
                                     </m:r>
                                   </m:sub>
                                 </m:sSub>
@@ -20547,13 +20538,10 @@
                                   </m:e>
                                   <m:sub>
                                     <m:r>
-                                      <m:t>n</m:t>
+                                      <m:t>1</m:t>
                                     </m:r>
                                     <m:r>
-                                      <m:t>,</m:t>
-                                    </m:r>
-                                    <m:r>
-                                      <m:t>p</m:t>
+                                      <m:t>n</m:t>
                                     </m:r>
                                   </m:sub>
                                 </m:sSub>
@@ -20578,13 +20566,10 @@
                                   </m:e>
                                   <m:sub>
                                     <m:r>
-                                      <m:t>n</m:t>
+                                      <m:t>p</m:t>
                                     </m:r>
                                     <m:r>
-                                      <m:t>,</m:t>
-                                    </m:r>
-                                    <m:r>
-                                      <m:t>p</m:t>
+                                      <m:t>n</m:t>
                                     </m:r>
                                   </m:sub>
                                 </m:sSub>
@@ -20593,88 +20578,6 @@
                           </m:m>
                         </m:e>
                       </m:d>
-                    </m:oMath>
-                  </m:oMathPara>
-                </a14:m>
-              </a:p>
-              <a:p>
-                <a:pPr lvl="0" marL="0" indent="0">
-                  <a:buNone/>
-                </a:pPr>
-                <a14:m>
-                  <m:oMathPara xmlns:m="http://schemas.openxmlformats.org/officeDocument/2006/math">
-                    <m:oMathParaPr>
-                      <m:jc m:val="center"/>
-                    </m:oMathParaPr>
-                    <m:oMath>
-                      <m:r>
-                        <m:t> </m:t>
-                      </m:r>
-                    </m:oMath>
-                  </m:oMathPara>
-                </a14:m>
-              </a:p>
-              <a:p>
-                <a:pPr lvl="0" marL="0" indent="0">
-                  <a:buNone/>
-                </a:pPr>
-                <a14:m>
-                  <m:oMathPara xmlns:m="http://schemas.openxmlformats.org/officeDocument/2006/math">
-                    <m:oMathParaPr>
-                      <m:jc m:val="center"/>
-                    </m:oMathParaPr>
-                    <m:oMath>
-                      <m:r>
-                        <m:rPr>
-                          <m:sty m:val="b"/>
-                        </m:rPr>
-                        <m:t>ϵ</m:t>
-                      </m:r>
-                      <m:r>
-                        <m:t>=</m:t>
-                      </m:r>
-                      <m:r>
-                        <m:t>(</m:t>
-                      </m:r>
-                      <m:sSub>
-                        <m:e>
-                          <m:r>
-                            <m:t>ϵ</m:t>
-                          </m:r>
-                        </m:e>
-                        <m:sub>
-                          <m:r>
-                            <m:t>1</m:t>
-                          </m:r>
-                        </m:sub>
-                      </m:sSub>
-                      <m:r>
-                        <m:t>…</m:t>
-                      </m:r>
-                      <m:sSub>
-                        <m:e>
-                          <m:r>
-                            <m:t>ϵ</m:t>
-                          </m:r>
-                        </m:e>
-                        <m:sub>
-                          <m:r>
-                            <m:t>n</m:t>
-                          </m:r>
-                        </m:sub>
-                      </m:sSub>
-                      <m:sSup>
-                        <m:e>
-                          <m:r>
-                            <m:t>)</m:t>
-                          </m:r>
-                        </m:e>
-                        <m:sup>
-                          <m:r>
-                            <m:t>T</m:t>
-                          </m:r>
-                        </m:sup>
-                      </m:sSup>
                     </m:oMath>
                   </m:oMathPara>
                 </a14:m>
@@ -20748,6 +20651,88 @@
                         <m:sub>
                           <m:r>
                             <m:t>p</m:t>
+                          </m:r>
+                        </m:sub>
+                      </m:sSub>
+                      <m:sSup>
+                        <m:e>
+                          <m:r>
+                            <m:t>)</m:t>
+                          </m:r>
+                        </m:e>
+                        <m:sup>
+                          <m:r>
+                            <m:t>T</m:t>
+                          </m:r>
+                        </m:sup>
+                      </m:sSup>
+                    </m:oMath>
+                  </m:oMathPara>
+                </a14:m>
+              </a:p>
+              <a:p>
+                <a:pPr lvl="0" marL="0" indent="0">
+                  <a:buNone/>
+                </a:pPr>
+                <a14:m>
+                  <m:oMathPara xmlns:m="http://schemas.openxmlformats.org/officeDocument/2006/math">
+                    <m:oMathParaPr>
+                      <m:jc m:val="center"/>
+                    </m:oMathParaPr>
+                    <m:oMath>
+                      <m:r>
+                        <m:t> </m:t>
+                      </m:r>
+                    </m:oMath>
+                  </m:oMathPara>
+                </a14:m>
+              </a:p>
+              <a:p>
+                <a:pPr lvl="0" marL="0" indent="0">
+                  <a:buNone/>
+                </a:pPr>
+                <a14:m>
+                  <m:oMathPara xmlns:m="http://schemas.openxmlformats.org/officeDocument/2006/math">
+                    <m:oMathParaPr>
+                      <m:jc m:val="center"/>
+                    </m:oMathParaPr>
+                    <m:oMath>
+                      <m:r>
+                        <m:rPr>
+                          <m:sty m:val="b"/>
+                        </m:rPr>
+                        <m:t>ϵ</m:t>
+                      </m:r>
+                      <m:r>
+                        <m:t>=</m:t>
+                      </m:r>
+                      <m:r>
+                        <m:t>(</m:t>
+                      </m:r>
+                      <m:sSub>
+                        <m:e>
+                          <m:r>
+                            <m:t>ϵ</m:t>
+                          </m:r>
+                        </m:e>
+                        <m:sub>
+                          <m:r>
+                            <m:t>1</m:t>
+                          </m:r>
+                        </m:sub>
+                      </m:sSub>
+                      <m:r>
+                        <m:t>…</m:t>
+                      </m:r>
+                      <m:sSub>
+                        <m:e>
+                          <m:r>
+                            <m:t>ϵ</m:t>
+                          </m:r>
+                        </m:e>
+                        <m:sub>
+                          <m:r>
+                            <m:t>n</m:t>
                           </m:r>
                         </m:sub>
                       </m:sSub>
@@ -21158,6 +21143,207 @@
                     </m:oMath>
                   </m:oMathPara>
                 </a14:m>
+              </a:p>
+              <a:p>
+                <a:pPr lvl="0" marL="0" indent="0">
+                  <a:buNone/>
+                </a:pPr>
+                <a14:m>
+                  <m:oMathPara xmlns:m="http://schemas.openxmlformats.org/officeDocument/2006/math">
+                    <m:oMathParaPr>
+                      <m:jc m:val="center"/>
+                    </m:oMathParaPr>
+                    <m:oMath>
+                      <m:r>
+                        <m:t> </m:t>
+                      </m:r>
+                    </m:oMath>
+                  </m:oMathPara>
+                </a14:m>
+              </a:p>
+              <a:p>
+                <a:pPr lvl="0" marL="0" indent="0">
+                  <a:buNone/>
+                </a:pPr>
+                <a14:m>
+                  <m:oMath xmlns:m="http://schemas.openxmlformats.org/officeDocument/2006/math">
+                    <m:r>
+                      <m:rPr>
+                        <m:sty m:val="b"/>
+                      </m:rPr>
+                      <m:t>X</m:t>
+                    </m:r>
+                  </m:oMath>
+                </a14:m>
+                <a:r>
+                  <a:rPr/>
+                  <a:t> is called the </a:t>
+                </a:r>
+                <a:r>
+                  <a:rPr b="1"/>
+                  <a:t>design matrix</a:t>
+                </a:r>
+                <a:r>
+                  <a:rPr/>
+                  <a:t>.</a:t>
+                </a:r>
+              </a:p>
+              <a:p>
+                <a:pPr lvl="0" marL="0" indent="0">
+                  <a:buNone/>
+                </a:pPr>
+                <a:r>
+                  <a:rPr/>
+                  <a:t>Dimensions: </a:t>
+                </a:r>
+                <a14:m>
+                  <m:oMath xmlns:m="http://schemas.openxmlformats.org/officeDocument/2006/math">
+                    <m:r>
+                      <m:rPr>
+                        <m:sty m:val="b"/>
+                      </m:rPr>
+                      <m:t>Y</m:t>
+                    </m:r>
+                  </m:oMath>
+                </a14:m>
+                <a:r>
+                  <a:rPr/>
+                  <a:t> is </a:t>
+                </a:r>
+                <a14:m>
+                  <m:oMath xmlns:m="http://schemas.openxmlformats.org/officeDocument/2006/math">
+                    <m:r>
+                      <m:t>n</m:t>
+                    </m:r>
+                    <m:r>
+                      <m:t>×</m:t>
+                    </m:r>
+                    <m:r>
+                      <m:t>1</m:t>
+                    </m:r>
+                  </m:oMath>
+                </a14:m>
+                <a:r>
+                  <a:rPr/>
+                  <a:t>, </a:t>
+                </a:r>
+                <a14:m>
+                  <m:oMath xmlns:m="http://schemas.openxmlformats.org/officeDocument/2006/math">
+                    <m:r>
+                      <m:rPr>
+                        <m:sty m:val="b"/>
+                      </m:rPr>
+                      <m:t>X</m:t>
+                    </m:r>
+                  </m:oMath>
+                </a14:m>
+                <a:r>
+                  <a:rPr/>
+                  <a:t> is </a:t>
+                </a:r>
+                <a14:m>
+                  <m:oMath xmlns:m="http://schemas.openxmlformats.org/officeDocument/2006/math">
+                    <m:r>
+                      <m:t>n</m:t>
+                    </m:r>
+                    <m:r>
+                      <m:t>×</m:t>
+                    </m:r>
+                    <m:r>
+                      <m:t>(</m:t>
+                    </m:r>
+                    <m:r>
+                      <m:t>p</m:t>
+                    </m:r>
+                    <m:r>
+                      <m:t>+</m:t>
+                    </m:r>
+                    <m:r>
+                      <m:t>1</m:t>
+                    </m:r>
+                    <m:r>
+                      <m:t>)</m:t>
+                    </m:r>
+                  </m:oMath>
+                </a14:m>
+                <a:r>
+                  <a:rPr/>
+                  <a:t>, </a:t>
+                </a:r>
+                <a14:m>
+                  <m:oMath xmlns:m="http://schemas.openxmlformats.org/officeDocument/2006/math">
+                    <m:r>
+                      <m:rPr>
+                        <m:sty m:val="b"/>
+                      </m:rPr>
+                      <m:t>β</m:t>
+                    </m:r>
+                  </m:oMath>
+                </a14:m>
+                <a:r>
+                  <a:rPr/>
+                  <a:t> is </a:t>
+                </a:r>
+                <a14:m>
+                  <m:oMath xmlns:m="http://schemas.openxmlformats.org/officeDocument/2006/math">
+                    <m:r>
+                      <m:t>(</m:t>
+                    </m:r>
+                    <m:r>
+                      <m:t>p</m:t>
+                    </m:r>
+                    <m:r>
+                      <m:t>+</m:t>
+                    </m:r>
+                    <m:r>
+                      <m:t>1</m:t>
+                    </m:r>
+                    <m:r>
+                      <m:t>)</m:t>
+                    </m:r>
+                    <m:r>
+                      <m:t>×</m:t>
+                    </m:r>
+                    <m:r>
+                      <m:t>1</m:t>
+                    </m:r>
+                  </m:oMath>
+                </a14:m>
+                <a:r>
+                  <a:rPr/>
+                  <a:t>, </a:t>
+                </a:r>
+                <a14:m>
+                  <m:oMath xmlns:m="http://schemas.openxmlformats.org/officeDocument/2006/math">
+                    <m:r>
+                      <m:rPr>
+                        <m:sty m:val="b"/>
+                      </m:rPr>
+                      <m:t>ϵ</m:t>
+                    </m:r>
+                  </m:oMath>
+                </a14:m>
+                <a:r>
+                  <a:rPr/>
+                  <a:t> is </a:t>
+                </a:r>
+                <a14:m>
+                  <m:oMath xmlns:m="http://schemas.openxmlformats.org/officeDocument/2006/math">
+                    <m:r>
+                      <m:t>x</m:t>
+                    </m:r>
+                    <m:r>
+                      <m:t>×</m:t>
+                    </m:r>
+                    <m:r>
+                      <m:t>1</m:t>
+                    </m:r>
+                  </m:oMath>
+                </a14:m>
+                <a:r>
+                  <a:rPr/>
+                  <a:t>.</a:t>
+                </a:r>
               </a:p>
             </p:txBody>
           </p:sp>

</xml_diff>

<commit_message>
Updating session 1 & 2 notes
</commit_message>
<xml_diff>
--- a/Chanco_ST6103_GLM_2019_Henrion_Session1.pptx
+++ b/Chanco_ST6103_GLM_2019_Henrion_Session1.pptx
@@ -20928,6 +20928,9 @@
                 <a14:m>
                   <m:oMath xmlns:m="http://schemas.openxmlformats.org/officeDocument/2006/math">
                     <m:r>
+                      <m:rPr>
+                        <m:sty m:val="b"/>
+                      </m:rPr>
                       <m:t>ϵ</m:t>
                     </m:r>
                     <m:r>
@@ -21330,7 +21333,7 @@
                 <a14:m>
                   <m:oMath xmlns:m="http://schemas.openxmlformats.org/officeDocument/2006/math">
                     <m:r>
-                      <m:t>x</m:t>
+                      <m:t>n</m:t>
                     </m:r>
                     <m:r>
                       <m:t>×</m:t>
@@ -21622,7 +21625,7 @@
                 </a14:m>
                 <a:r>
                   <a:rPr/>
-                  <a:t> to be invertible.</a:t>
+                  <a:t> to be invertible (though general inverse could be used).</a:t>
                 </a:r>
               </a:p>
             </p:txBody>

</xml_diff>